<commit_message>
final final final vversion unless he says to make changes i guess
</commit_message>
<xml_diff>
--- a/Capstone Final Project Presentation.pptx
+++ b/Capstone Final Project Presentation.pptx
@@ -14,8 +14,8 @@
     <p:sldId id="283" r:id="rId8"/>
     <p:sldId id="260" r:id="rId9"/>
     <p:sldId id="274" r:id="rId10"/>
-    <p:sldId id="261" r:id="rId11"/>
-    <p:sldId id="262" r:id="rId12"/>
+    <p:sldId id="262" r:id="rId11"/>
+    <p:sldId id="261" r:id="rId12"/>
     <p:sldId id="267" r:id="rId13"/>
     <p:sldId id="264" r:id="rId14"/>
     <p:sldId id="275" r:id="rId15"/>
@@ -3823,13 +3823,13 @@
         </p:nvSpPr>
         <p:spPr>
           <a:xfrm>
-            <a:off x="1653362" y="365760"/>
-            <a:ext cx="10326201" cy="1019695"/>
+            <a:off x="1653363" y="365760"/>
+            <a:ext cx="9945970" cy="1188720"/>
           </a:xfrm>
         </p:spPr>
         <p:txBody>
           <a:bodyPr>
-            <a:noAutofit/>
+            <a:normAutofit/>
           </a:bodyPr>
           <a:lstStyle/>
           <a:p>
@@ -3838,8 +3838,9 @@
                 <a:effectLst/>
                 <a:latin typeface="Consolas" panose="020B0609020204030204" pitchFamily="49" charset="0"/>
               </a:rPr>
-              <a:t>Characterization of the sensors’ performance and operation</a:t>
-            </a:r>
+              <a:t>Characterization of the sensor’ performance and operation</a:t>
+            </a:r>
+            <a:endParaRPr lang="en-US" sz="3200" b="1" dirty="0"/>
           </a:p>
         </p:txBody>
       </p:sp>
@@ -4315,100 +4316,48 @@
       </p:sp>
       <p:sp>
         <p:nvSpPr>
-          <p:cNvPr id="6" name="TextBox 5">
-            <a:extLst>
-              <a:ext uri="{FF2B5EF4-FFF2-40B4-BE49-F238E27FC236}">
-                <a16:creationId xmlns:a16="http://schemas.microsoft.com/office/drawing/2014/main" id="{3B0DE6F5-BDAF-70D5-F06B-00F1A317A0B6}"/>
-              </a:ext>
-            </a:extLst>
-          </p:cNvPr>
-          <p:cNvSpPr txBox="1"/>
-          <p:nvPr/>
+          <p:cNvPr id="3" name="Content Placeholder 2">
+            <a:extLst>
+              <a:ext uri="{FF2B5EF4-FFF2-40B4-BE49-F238E27FC236}">
+                <a16:creationId xmlns:a16="http://schemas.microsoft.com/office/drawing/2014/main" id="{85916CBC-B45C-9EF8-7084-26F25C559773}"/>
+              </a:ext>
+            </a:extLst>
+          </p:cNvPr>
+          <p:cNvSpPr>
+            <a:spLocks noGrp="1"/>
+          </p:cNvSpPr>
+          <p:nvPr>
+            <p:ph idx="1"/>
+          </p:nvPr>
         </p:nvSpPr>
         <p:spPr>
           <a:xfrm>
-            <a:off x="349132" y="4791970"/>
-            <a:ext cx="11493736" cy="2031325"/>
+            <a:off x="1246909" y="1695372"/>
+            <a:ext cx="10945090" cy="5162628"/>
           </a:xfrm>
-          <a:prstGeom prst="rect">
-            <a:avLst/>
-          </a:prstGeom>
-          <a:noFill/>
         </p:spPr>
         <p:txBody>
-          <a:bodyPr wrap="square" rtlCol="0">
-            <a:spAutoFit/>
+          <a:bodyPr anchor="t">
+            <a:normAutofit/>
           </a:bodyPr>
           <a:lstStyle/>
           <a:p>
-            <a:r>
-              <a:rPr lang="en-US" b="1" u="sng" dirty="0"/>
-              <a:t>Potentially Faulty Sensors/Unexpected Patters in Sensor Behavior</a:t>
-            </a:r>
-          </a:p>
-          <a:p>
-            <a:pPr marL="285750" indent="-285750">
-              <a:buFont typeface="Arial" panose="020B0604020202020204" pitchFamily="34" charset="0"/>
-              <a:buChar char="•"/>
+            <a:pPr marL="0" indent="0">
+              <a:buNone/>
             </a:pPr>
             <a:r>
-              <a:rPr lang="en-US" dirty="0"/>
-              <a:t>Sensor 8</a:t>
-            </a:r>
-          </a:p>
-          <a:p>
-            <a:pPr marL="742950" lvl="1" indent="-285750">
-              <a:buFont typeface="Arial" panose="020B0604020202020204" pitchFamily="34" charset="0"/>
-              <a:buChar char="•"/>
-            </a:pPr>
-            <a:r>
-              <a:rPr lang="en-US" dirty="0"/>
-              <a:t>In April, sensor is picking up 12 significant signals in ¾ chemicals. Going into August, it is only detecting background noise. Then going into December, only 1 spike in </a:t>
-            </a:r>
-            <a:r>
-              <a:rPr lang="en-US" dirty="0" err="1"/>
-              <a:t>Methylosmolene</a:t>
-            </a:r>
-            <a:r>
-              <a:rPr lang="en-US" dirty="0"/>
-              <a:t> is detected.</a:t>
-            </a:r>
-          </a:p>
-          <a:p>
-            <a:pPr marL="285750" indent="-285750">
-              <a:buFont typeface="Arial" panose="020B0604020202020204" pitchFamily="34" charset="0"/>
-              <a:buChar char="•"/>
-            </a:pPr>
-            <a:r>
-              <a:rPr lang="en-US" dirty="0"/>
-              <a:t>Sensor 9</a:t>
-            </a:r>
-          </a:p>
-          <a:p>
-            <a:pPr marL="742950" lvl="1" indent="-285750">
-              <a:buFont typeface="Arial" panose="020B0604020202020204" pitchFamily="34" charset="0"/>
-              <a:buChar char="•"/>
-            </a:pPr>
-            <a:r>
-              <a:rPr lang="en-US" dirty="0"/>
-              <a:t>In August, the background noise increases towards the end of the month.</a:t>
-            </a:r>
-          </a:p>
-          <a:p>
-            <a:pPr marL="742950" lvl="1" indent="-285750">
-              <a:buFont typeface="Arial" panose="020B0604020202020204" pitchFamily="34" charset="0"/>
-              <a:buChar char="•"/>
-            </a:pPr>
-            <a:endParaRPr lang="en-US" dirty="0"/>
+              <a:rPr lang="en-US" sz="2400" dirty="0"/>
+              <a:t>In order to determine if a significant increase is being detected by each sensor, the mean of all readings in the sensor group was calculated, then the cutoff for significance was assigned as the mean + ( 3 * standard deviation).</a:t>
+            </a:r>
           </a:p>
         </p:txBody>
       </p:sp>
       <p:pic>
         <p:nvPicPr>
-          <p:cNvPr id="14" name="Picture 13">
-            <a:extLst>
-              <a:ext uri="{FF2B5EF4-FFF2-40B4-BE49-F238E27FC236}">
-                <a16:creationId xmlns:a16="http://schemas.microsoft.com/office/drawing/2014/main" id="{14FB052A-AE5B-5180-4BA9-9FEDF80E59B1}"/>
+          <p:cNvPr id="5" name="Picture 4">
+            <a:extLst>
+              <a:ext uri="{FF2B5EF4-FFF2-40B4-BE49-F238E27FC236}">
+                <a16:creationId xmlns:a16="http://schemas.microsoft.com/office/drawing/2014/main" id="{7173E0CB-1050-829F-9FB0-7AD534D488AC}"/>
               </a:ext>
             </a:extLst>
           </p:cNvPr>
@@ -4425,20 +4374,56 @@
         </p:blipFill>
         <p:spPr>
           <a:xfrm>
-            <a:off x="8289254" y="1823113"/>
-            <a:ext cx="3738561" cy="2968857"/>
+            <a:off x="1246908" y="3327956"/>
+            <a:ext cx="4629843" cy="3356024"/>
           </a:xfrm>
           <a:prstGeom prst="rect">
             <a:avLst/>
           </a:prstGeom>
         </p:spPr>
       </p:pic>
+      <p:sp>
+        <p:nvSpPr>
+          <p:cNvPr id="6" name="TextBox 5">
+            <a:extLst>
+              <a:ext uri="{FF2B5EF4-FFF2-40B4-BE49-F238E27FC236}">
+                <a16:creationId xmlns:a16="http://schemas.microsoft.com/office/drawing/2014/main" id="{D0AD4B54-87DA-932B-67A8-48E5F1B02AFD}"/>
+              </a:ext>
+            </a:extLst>
+          </p:cNvPr>
+          <p:cNvSpPr txBox="1"/>
+          <p:nvPr/>
+        </p:nvSpPr>
+        <p:spPr>
+          <a:xfrm>
+            <a:off x="1246908" y="2958624"/>
+            <a:ext cx="4629842" cy="369332"/>
+          </a:xfrm>
+          <a:prstGeom prst="rect">
+            <a:avLst/>
+          </a:prstGeom>
+          <a:noFill/>
+        </p:spPr>
+        <p:txBody>
+          <a:bodyPr wrap="square" rtlCol="0">
+            <a:spAutoFit/>
+          </a:bodyPr>
+          <a:lstStyle/>
+          <a:p>
+            <a:pPr algn="ctr"/>
+            <a:r>
+              <a:rPr lang="en-US" dirty="0"/>
+              <a:t>Significance Cut-Off Calculations</a:t>
+            </a:r>
+          </a:p>
+        </p:txBody>
+      </p:sp>
       <p:pic>
         <p:nvPicPr>
-          <p:cNvPr id="22" name="Picture 21">
-            <a:extLst>
-              <a:ext uri="{FF2B5EF4-FFF2-40B4-BE49-F238E27FC236}">
-                <a16:creationId xmlns:a16="http://schemas.microsoft.com/office/drawing/2014/main" id="{11D107DC-08FC-1A7A-F454-AF0ED054E2E2}"/>
+          <p:cNvPr id="8" name="Picture 7">
+            <a:extLst>
+              <a:ext uri="{FF2B5EF4-FFF2-40B4-BE49-F238E27FC236}">
+                <a16:creationId xmlns:a16="http://schemas.microsoft.com/office/drawing/2014/main" id="{52AA29BB-4DB9-A0D0-7503-7DF20A5778C8}"/>
               </a:ext>
             </a:extLst>
           </p:cNvPr>
@@ -4455,90 +4440,18 @@
         </p:blipFill>
         <p:spPr>
           <a:xfrm>
-            <a:off x="1214436" y="1783547"/>
-            <a:ext cx="3662363" cy="2945929"/>
+            <a:off x="6693940" y="2945860"/>
+            <a:ext cx="4734952" cy="3738120"/>
           </a:xfrm>
           <a:prstGeom prst="rect">
             <a:avLst/>
           </a:prstGeom>
         </p:spPr>
       </p:pic>
-      <p:pic>
-        <p:nvPicPr>
-          <p:cNvPr id="23" name="Picture 22">
-            <a:extLst>
-              <a:ext uri="{FF2B5EF4-FFF2-40B4-BE49-F238E27FC236}">
-                <a16:creationId xmlns:a16="http://schemas.microsoft.com/office/drawing/2014/main" id="{5811AEFF-DB76-33DA-4965-B101714C6827}"/>
-              </a:ext>
-            </a:extLst>
-          </p:cNvPr>
-          <p:cNvPicPr>
-            <a:picLocks noChangeAspect="1"/>
-          </p:cNvPicPr>
-          <p:nvPr/>
-        </p:nvPicPr>
-        <p:blipFill>
-          <a:blip r:embed="rId4"/>
-          <a:stretch>
-            <a:fillRect/>
-          </a:stretch>
-        </p:blipFill>
-        <p:spPr>
-          <a:xfrm>
-            <a:off x="5119581" y="2093424"/>
-            <a:ext cx="2856781" cy="2326176"/>
-          </a:xfrm>
-          <a:prstGeom prst="rect">
-            <a:avLst/>
-          </a:prstGeom>
-        </p:spPr>
-      </p:pic>
-      <p:cxnSp>
-        <p:nvCxnSpPr>
-          <p:cNvPr id="24" name="Straight Arrow Connector 23">
-            <a:extLst>
-              <a:ext uri="{FF2B5EF4-FFF2-40B4-BE49-F238E27FC236}">
-                <a16:creationId xmlns:a16="http://schemas.microsoft.com/office/drawing/2014/main" id="{B1B17B33-E9CE-DEEA-86C9-E13EDF768D5A}"/>
-              </a:ext>
-            </a:extLst>
-          </p:cNvPr>
-          <p:cNvCxnSpPr>
-            <a:stCxn id="22" idx="3"/>
-            <a:endCxn id="23" idx="1"/>
-          </p:cNvCxnSpPr>
-          <p:nvPr/>
-        </p:nvCxnSpPr>
-        <p:spPr>
-          <a:xfrm>
-            <a:off x="4876799" y="3256512"/>
-            <a:ext cx="242782" cy="0"/>
-          </a:xfrm>
-          <a:prstGeom prst="straightConnector1">
-            <a:avLst/>
-          </a:prstGeom>
-          <a:ln>
-            <a:tailEnd type="triangle"/>
-          </a:ln>
-        </p:spPr>
-        <p:style>
-          <a:lnRef idx="2">
-            <a:schemeClr val="dk1"/>
-          </a:lnRef>
-          <a:fillRef idx="0">
-            <a:schemeClr val="dk1"/>
-          </a:fillRef>
-          <a:effectRef idx="1">
-            <a:schemeClr val="dk1"/>
-          </a:effectRef>
-          <a:fontRef idx="minor">
-            <a:schemeClr val="tx1"/>
-          </a:fontRef>
-        </p:style>
-      </p:cxnSp>
     </p:spTree>
     <p:extLst>
       <p:ext uri="{BB962C8B-B14F-4D97-AF65-F5344CB8AC3E}">
-        <p14:creationId xmlns:p14="http://schemas.microsoft.com/office/powerpoint/2010/main" val="679729516"/>
+        <p14:creationId xmlns:p14="http://schemas.microsoft.com/office/powerpoint/2010/main" val="1094485203"/>
       </p:ext>
     </p:extLst>
   </p:cSld>
@@ -4591,13 +4504,13 @@
         </p:nvSpPr>
         <p:spPr>
           <a:xfrm>
-            <a:off x="1653363" y="365760"/>
-            <a:ext cx="9945970" cy="1188720"/>
+            <a:off x="1653362" y="365760"/>
+            <a:ext cx="10326201" cy="1019695"/>
           </a:xfrm>
         </p:spPr>
         <p:txBody>
           <a:bodyPr>
-            <a:normAutofit/>
+            <a:noAutofit/>
           </a:bodyPr>
           <a:lstStyle/>
           <a:p>
@@ -4606,9 +4519,8 @@
                 <a:effectLst/>
                 <a:latin typeface="Consolas" panose="020B0609020204030204" pitchFamily="49" charset="0"/>
               </a:rPr>
-              <a:t>Characterization of the sensor’ performance and operation</a:t>
-            </a:r>
-            <a:endParaRPr lang="en-US" sz="3200" b="1" dirty="0"/>
+              <a:t>Characterization of the sensors’ performance and operation</a:t>
+            </a:r>
           </a:p>
         </p:txBody>
       </p:sp>
@@ -5084,48 +4996,100 @@
       </p:sp>
       <p:sp>
         <p:nvSpPr>
-          <p:cNvPr id="3" name="Content Placeholder 2">
-            <a:extLst>
-              <a:ext uri="{FF2B5EF4-FFF2-40B4-BE49-F238E27FC236}">
-                <a16:creationId xmlns:a16="http://schemas.microsoft.com/office/drawing/2014/main" id="{85916CBC-B45C-9EF8-7084-26F25C559773}"/>
-              </a:ext>
-            </a:extLst>
-          </p:cNvPr>
-          <p:cNvSpPr>
-            <a:spLocks noGrp="1"/>
-          </p:cNvSpPr>
-          <p:nvPr>
-            <p:ph idx="1"/>
-          </p:nvPr>
+          <p:cNvPr id="6" name="TextBox 5">
+            <a:extLst>
+              <a:ext uri="{FF2B5EF4-FFF2-40B4-BE49-F238E27FC236}">
+                <a16:creationId xmlns:a16="http://schemas.microsoft.com/office/drawing/2014/main" id="{3B0DE6F5-BDAF-70D5-F06B-00F1A317A0B6}"/>
+              </a:ext>
+            </a:extLst>
+          </p:cNvPr>
+          <p:cNvSpPr txBox="1"/>
+          <p:nvPr/>
         </p:nvSpPr>
         <p:spPr>
           <a:xfrm>
-            <a:off x="1246909" y="1695372"/>
-            <a:ext cx="10945090" cy="5162628"/>
+            <a:off x="349132" y="4791970"/>
+            <a:ext cx="11493736" cy="2031325"/>
           </a:xfrm>
+          <a:prstGeom prst="rect">
+            <a:avLst/>
+          </a:prstGeom>
+          <a:noFill/>
         </p:spPr>
         <p:txBody>
-          <a:bodyPr anchor="t">
-            <a:normAutofit/>
+          <a:bodyPr wrap="square" rtlCol="0">
+            <a:spAutoFit/>
           </a:bodyPr>
           <a:lstStyle/>
           <a:p>
-            <a:pPr marL="0" indent="0">
-              <a:buNone/>
+            <a:r>
+              <a:rPr lang="en-US" b="1" u="sng" dirty="0"/>
+              <a:t>Potentially Faulty Sensors/Unexpected Patters in Sensor Behavior</a:t>
+            </a:r>
+          </a:p>
+          <a:p>
+            <a:pPr marL="285750" indent="-285750">
+              <a:buFont typeface="Arial" panose="020B0604020202020204" pitchFamily="34" charset="0"/>
+              <a:buChar char="•"/>
             </a:pPr>
             <a:r>
-              <a:rPr lang="en-US" sz="2400" dirty="0"/>
-              <a:t>In order to determine if a significant increase is being detected by each sensor, the mean of all readings in the sensor group was calculated, then the cutoff for significance was assigned as the mean + ( 3 * standard deviation).</a:t>
-            </a:r>
+              <a:rPr lang="en-US" dirty="0"/>
+              <a:t>Sensor 8</a:t>
+            </a:r>
+          </a:p>
+          <a:p>
+            <a:pPr marL="742950" lvl="1" indent="-285750">
+              <a:buFont typeface="Arial" panose="020B0604020202020204" pitchFamily="34" charset="0"/>
+              <a:buChar char="•"/>
+            </a:pPr>
+            <a:r>
+              <a:rPr lang="en-US" dirty="0"/>
+              <a:t>In April, sensor is picking up 12 significant signals in ¾ chemicals. Going into August, it is only detecting background noise. Then going into December, only 1 spike in </a:t>
+            </a:r>
+            <a:r>
+              <a:rPr lang="en-US" dirty="0" err="1"/>
+              <a:t>Methylosmolene</a:t>
+            </a:r>
+            <a:r>
+              <a:rPr lang="en-US" dirty="0"/>
+              <a:t> is detected.</a:t>
+            </a:r>
+          </a:p>
+          <a:p>
+            <a:pPr marL="285750" indent="-285750">
+              <a:buFont typeface="Arial" panose="020B0604020202020204" pitchFamily="34" charset="0"/>
+              <a:buChar char="•"/>
+            </a:pPr>
+            <a:r>
+              <a:rPr lang="en-US" dirty="0"/>
+              <a:t>Sensor 9</a:t>
+            </a:r>
+          </a:p>
+          <a:p>
+            <a:pPr marL="742950" lvl="1" indent="-285750">
+              <a:buFont typeface="Arial" panose="020B0604020202020204" pitchFamily="34" charset="0"/>
+              <a:buChar char="•"/>
+            </a:pPr>
+            <a:r>
+              <a:rPr lang="en-US" dirty="0"/>
+              <a:t>In August, the background noise increases towards the end of the month.</a:t>
+            </a:r>
+          </a:p>
+          <a:p>
+            <a:pPr marL="742950" lvl="1" indent="-285750">
+              <a:buFont typeface="Arial" panose="020B0604020202020204" pitchFamily="34" charset="0"/>
+              <a:buChar char="•"/>
+            </a:pPr>
+            <a:endParaRPr lang="en-US" dirty="0"/>
           </a:p>
         </p:txBody>
       </p:sp>
       <p:pic>
         <p:nvPicPr>
-          <p:cNvPr id="5" name="Picture 4">
-            <a:extLst>
-              <a:ext uri="{FF2B5EF4-FFF2-40B4-BE49-F238E27FC236}">
-                <a16:creationId xmlns:a16="http://schemas.microsoft.com/office/drawing/2014/main" id="{7173E0CB-1050-829F-9FB0-7AD534D488AC}"/>
+          <p:cNvPr id="14" name="Picture 13">
+            <a:extLst>
+              <a:ext uri="{FF2B5EF4-FFF2-40B4-BE49-F238E27FC236}">
+                <a16:creationId xmlns:a16="http://schemas.microsoft.com/office/drawing/2014/main" id="{14FB052A-AE5B-5180-4BA9-9FEDF80E59B1}"/>
               </a:ext>
             </a:extLst>
           </p:cNvPr>
@@ -5142,56 +5106,20 @@
         </p:blipFill>
         <p:spPr>
           <a:xfrm>
-            <a:off x="1246908" y="3327956"/>
-            <a:ext cx="4629843" cy="3356024"/>
+            <a:off x="8289254" y="1823113"/>
+            <a:ext cx="3738561" cy="2968857"/>
           </a:xfrm>
           <a:prstGeom prst="rect">
             <a:avLst/>
           </a:prstGeom>
         </p:spPr>
       </p:pic>
-      <p:sp>
-        <p:nvSpPr>
-          <p:cNvPr id="6" name="TextBox 5">
-            <a:extLst>
-              <a:ext uri="{FF2B5EF4-FFF2-40B4-BE49-F238E27FC236}">
-                <a16:creationId xmlns:a16="http://schemas.microsoft.com/office/drawing/2014/main" id="{D0AD4B54-87DA-932B-67A8-48E5F1B02AFD}"/>
-              </a:ext>
-            </a:extLst>
-          </p:cNvPr>
-          <p:cNvSpPr txBox="1"/>
-          <p:nvPr/>
-        </p:nvSpPr>
-        <p:spPr>
-          <a:xfrm>
-            <a:off x="1246908" y="2958624"/>
-            <a:ext cx="4629842" cy="369332"/>
-          </a:xfrm>
-          <a:prstGeom prst="rect">
-            <a:avLst/>
-          </a:prstGeom>
-          <a:noFill/>
-        </p:spPr>
-        <p:txBody>
-          <a:bodyPr wrap="square" rtlCol="0">
-            <a:spAutoFit/>
-          </a:bodyPr>
-          <a:lstStyle/>
-          <a:p>
-            <a:pPr algn="ctr"/>
-            <a:r>
-              <a:rPr lang="en-US" dirty="0"/>
-              <a:t>Significance Cut-Off Calculations</a:t>
-            </a:r>
-          </a:p>
-        </p:txBody>
-      </p:sp>
       <p:pic>
         <p:nvPicPr>
-          <p:cNvPr id="8" name="Picture 7">
-            <a:extLst>
-              <a:ext uri="{FF2B5EF4-FFF2-40B4-BE49-F238E27FC236}">
-                <a16:creationId xmlns:a16="http://schemas.microsoft.com/office/drawing/2014/main" id="{52AA29BB-4DB9-A0D0-7503-7DF20A5778C8}"/>
+          <p:cNvPr id="22" name="Picture 21">
+            <a:extLst>
+              <a:ext uri="{FF2B5EF4-FFF2-40B4-BE49-F238E27FC236}">
+                <a16:creationId xmlns:a16="http://schemas.microsoft.com/office/drawing/2014/main" id="{11D107DC-08FC-1A7A-F454-AF0ED054E2E2}"/>
               </a:ext>
             </a:extLst>
           </p:cNvPr>
@@ -5208,18 +5136,90 @@
         </p:blipFill>
         <p:spPr>
           <a:xfrm>
-            <a:off x="6693940" y="2945860"/>
-            <a:ext cx="4734952" cy="3738120"/>
+            <a:off x="1214436" y="1783547"/>
+            <a:ext cx="3662363" cy="2945929"/>
           </a:xfrm>
           <a:prstGeom prst="rect">
             <a:avLst/>
           </a:prstGeom>
         </p:spPr>
       </p:pic>
+      <p:pic>
+        <p:nvPicPr>
+          <p:cNvPr id="23" name="Picture 22">
+            <a:extLst>
+              <a:ext uri="{FF2B5EF4-FFF2-40B4-BE49-F238E27FC236}">
+                <a16:creationId xmlns:a16="http://schemas.microsoft.com/office/drawing/2014/main" id="{5811AEFF-DB76-33DA-4965-B101714C6827}"/>
+              </a:ext>
+            </a:extLst>
+          </p:cNvPr>
+          <p:cNvPicPr>
+            <a:picLocks noChangeAspect="1"/>
+          </p:cNvPicPr>
+          <p:nvPr/>
+        </p:nvPicPr>
+        <p:blipFill>
+          <a:blip r:embed="rId4"/>
+          <a:stretch>
+            <a:fillRect/>
+          </a:stretch>
+        </p:blipFill>
+        <p:spPr>
+          <a:xfrm>
+            <a:off x="5119581" y="2093424"/>
+            <a:ext cx="2856781" cy="2326176"/>
+          </a:xfrm>
+          <a:prstGeom prst="rect">
+            <a:avLst/>
+          </a:prstGeom>
+        </p:spPr>
+      </p:pic>
+      <p:cxnSp>
+        <p:nvCxnSpPr>
+          <p:cNvPr id="24" name="Straight Arrow Connector 23">
+            <a:extLst>
+              <a:ext uri="{FF2B5EF4-FFF2-40B4-BE49-F238E27FC236}">
+                <a16:creationId xmlns:a16="http://schemas.microsoft.com/office/drawing/2014/main" id="{B1B17B33-E9CE-DEEA-86C9-E13EDF768D5A}"/>
+              </a:ext>
+            </a:extLst>
+          </p:cNvPr>
+          <p:cNvCxnSpPr>
+            <a:stCxn id="22" idx="3"/>
+            <a:endCxn id="23" idx="1"/>
+          </p:cNvCxnSpPr>
+          <p:nvPr/>
+        </p:nvCxnSpPr>
+        <p:spPr>
+          <a:xfrm>
+            <a:off x="4876799" y="3256512"/>
+            <a:ext cx="242782" cy="0"/>
+          </a:xfrm>
+          <a:prstGeom prst="straightConnector1">
+            <a:avLst/>
+          </a:prstGeom>
+          <a:ln>
+            <a:tailEnd type="triangle"/>
+          </a:ln>
+        </p:spPr>
+        <p:style>
+          <a:lnRef idx="2">
+            <a:schemeClr val="dk1"/>
+          </a:lnRef>
+          <a:fillRef idx="0">
+            <a:schemeClr val="dk1"/>
+          </a:fillRef>
+          <a:effectRef idx="1">
+            <a:schemeClr val="dk1"/>
+          </a:effectRef>
+          <a:fontRef idx="minor">
+            <a:schemeClr val="tx1"/>
+          </a:fontRef>
+        </p:style>
+      </p:cxnSp>
     </p:spTree>
     <p:extLst>
       <p:ext uri="{BB962C8B-B14F-4D97-AF65-F5344CB8AC3E}">
-        <p14:creationId xmlns:p14="http://schemas.microsoft.com/office/powerpoint/2010/main" val="1094485203"/>
+        <p14:creationId xmlns:p14="http://schemas.microsoft.com/office/powerpoint/2010/main" val="679729516"/>
       </p:ext>
     </p:extLst>
   </p:cSld>
@@ -15700,7 +15700,7 @@
         </p:spPr>
         <p:txBody>
           <a:bodyPr anchor="t">
-            <a:normAutofit fontScale="92500"/>
+            <a:normAutofit/>
           </a:bodyPr>
           <a:lstStyle/>
           <a:p>
@@ -15709,7 +15709,7 @@
                 <a:effectLst/>
                 <a:latin typeface="Consolas" panose="020B0609020204030204" pitchFamily="49" charset="0"/>
               </a:rPr>
-              <a:t>Characterize the sensors’ performance and operation. Are they all working properly at all times? Can you detect any unexpected behaviors of the sensors through analyzing the readings they capture?</a:t>
+              <a:t>Characterize the sensors’ performance and operation. Are they all working properly at all times? Can we detect any unexpected behaviors of the sensors through analyzing the readings they capture?</a:t>
             </a:r>
           </a:p>
           <a:p>
@@ -15723,7 +15723,7 @@
                 <a:effectLst/>
                 <a:latin typeface="Consolas" panose="020B0609020204030204" pitchFamily="49" charset="0"/>
               </a:rPr>
-              <a:t>Now turn your attention to the chemicals themselves. Which chemicals are being detected by the sensor group? What patterns of chemical releases do you see, as being reported in the data?</a:t>
+              <a:t>Which chemicals are being detected by the sensor group? What patterns of chemical releases do we see, as being reported in the data?</a:t>
             </a:r>
           </a:p>
           <a:p>
@@ -15737,7 +15737,7 @@
                 <a:effectLst/>
                 <a:latin typeface="Consolas" panose="020B0609020204030204" pitchFamily="49" charset="0"/>
               </a:rPr>
-              <a:t>Which factories are responsible for which chemical releases? Carefully describe how you determined this using all the data you have available. For the factories you identified, describe any observed patterns of operation revealed in the data.</a:t>
+              <a:t>Which factories are responsible for which chemical releases? For the identified factories, are there any observed patterns of operation that can be described from the data?</a:t>
             </a:r>
           </a:p>
           <a:p>

</xml_diff>